<commit_message>
update hands-on 2 ppt
</commit_message>
<xml_diff>
--- a/Documents/TDD Hands On 2.pptx
+++ b/Documents/TDD Hands On 2.pptx
@@ -9,6 +9,7 @@
     <p:sldId id="258" r:id="rId3"/>
     <p:sldId id="260" r:id="rId4"/>
     <p:sldId id="259" r:id="rId5"/>
+    <p:sldId id="261" r:id="rId6"/>
   </p:sldIdLst>
   <p:sldSz cx="9144000" cy="6858000" type="screen4x3"/>
   <p:notesSz cx="6858000" cy="9144000"/>
@@ -291,7 +292,7 @@
           <a:p>
             <a:fld id="{29A55B27-5FC7-442E-B76A-670CDE01FE46}" type="datetimeFigureOut">
               <a:rPr lang="en-US" smtClean="0"/>
-              <a:t>6/30/2015</a:t>
+              <a:t>7/3/2015</a:t>
             </a:fld>
             <a:endParaRPr lang="en-US"/>
           </a:p>
@@ -461,7 +462,7 @@
           <a:p>
             <a:fld id="{29A55B27-5FC7-442E-B76A-670CDE01FE46}" type="datetimeFigureOut">
               <a:rPr lang="en-US" smtClean="0"/>
-              <a:t>6/30/2015</a:t>
+              <a:t>7/3/2015</a:t>
             </a:fld>
             <a:endParaRPr lang="en-US"/>
           </a:p>
@@ -641,7 +642,7 @@
           <a:p>
             <a:fld id="{29A55B27-5FC7-442E-B76A-670CDE01FE46}" type="datetimeFigureOut">
               <a:rPr lang="en-US" smtClean="0"/>
-              <a:t>6/30/2015</a:t>
+              <a:t>7/3/2015</a:t>
             </a:fld>
             <a:endParaRPr lang="en-US"/>
           </a:p>
@@ -811,7 +812,7 @@
           <a:p>
             <a:fld id="{29A55B27-5FC7-442E-B76A-670CDE01FE46}" type="datetimeFigureOut">
               <a:rPr lang="en-US" smtClean="0"/>
-              <a:t>6/30/2015</a:t>
+              <a:t>7/3/2015</a:t>
             </a:fld>
             <a:endParaRPr lang="en-US"/>
           </a:p>
@@ -1057,7 +1058,7 @@
           <a:p>
             <a:fld id="{29A55B27-5FC7-442E-B76A-670CDE01FE46}" type="datetimeFigureOut">
               <a:rPr lang="en-US" smtClean="0"/>
-              <a:t>6/30/2015</a:t>
+              <a:t>7/3/2015</a:t>
             </a:fld>
             <a:endParaRPr lang="en-US"/>
           </a:p>
@@ -1345,7 +1346,7 @@
           <a:p>
             <a:fld id="{29A55B27-5FC7-442E-B76A-670CDE01FE46}" type="datetimeFigureOut">
               <a:rPr lang="en-US" smtClean="0"/>
-              <a:t>6/30/2015</a:t>
+              <a:t>7/3/2015</a:t>
             </a:fld>
             <a:endParaRPr lang="en-US"/>
           </a:p>
@@ -1767,7 +1768,7 @@
           <a:p>
             <a:fld id="{29A55B27-5FC7-442E-B76A-670CDE01FE46}" type="datetimeFigureOut">
               <a:rPr lang="en-US" smtClean="0"/>
-              <a:t>6/30/2015</a:t>
+              <a:t>7/3/2015</a:t>
             </a:fld>
             <a:endParaRPr lang="en-US"/>
           </a:p>
@@ -1885,7 +1886,7 @@
           <a:p>
             <a:fld id="{29A55B27-5FC7-442E-B76A-670CDE01FE46}" type="datetimeFigureOut">
               <a:rPr lang="en-US" smtClean="0"/>
-              <a:t>6/30/2015</a:t>
+              <a:t>7/3/2015</a:t>
             </a:fld>
             <a:endParaRPr lang="en-US"/>
           </a:p>
@@ -1980,7 +1981,7 @@
           <a:p>
             <a:fld id="{29A55B27-5FC7-442E-B76A-670CDE01FE46}" type="datetimeFigureOut">
               <a:rPr lang="en-US" smtClean="0"/>
-              <a:t>6/30/2015</a:t>
+              <a:t>7/3/2015</a:t>
             </a:fld>
             <a:endParaRPr lang="en-US"/>
           </a:p>
@@ -2257,7 +2258,7 @@
           <a:p>
             <a:fld id="{29A55B27-5FC7-442E-B76A-670CDE01FE46}" type="datetimeFigureOut">
               <a:rPr lang="en-US" smtClean="0"/>
-              <a:t>6/30/2015</a:t>
+              <a:t>7/3/2015</a:t>
             </a:fld>
             <a:endParaRPr lang="en-US"/>
           </a:p>
@@ -2510,7 +2511,7 @@
           <a:p>
             <a:fld id="{29A55B27-5FC7-442E-B76A-670CDE01FE46}" type="datetimeFigureOut">
               <a:rPr lang="en-US" smtClean="0"/>
-              <a:t>6/30/2015</a:t>
+              <a:t>7/3/2015</a:t>
             </a:fld>
             <a:endParaRPr lang="en-US"/>
           </a:p>
@@ -2723,7 +2724,7 @@
           <a:p>
             <a:fld id="{29A55B27-5FC7-442E-B76A-670CDE01FE46}" type="datetimeFigureOut">
               <a:rPr lang="en-US" smtClean="0"/>
-              <a:t>6/30/2015</a:t>
+              <a:t>7/3/2015</a:t>
             </a:fld>
             <a:endParaRPr lang="en-US"/>
           </a:p>
@@ -3197,7 +3198,7 @@
           <a:p>
             <a:r>
               <a:rPr lang="en-US" dirty="0" smtClean="0"/>
-              <a:t>Homework</a:t>
+              <a:t>Homework Review </a:t>
             </a:r>
             <a:endParaRPr lang="en-US" dirty="0"/>
           </a:p>
@@ -3212,7 +3213,7 @@
         <p:spPr>
           <a:xfrm>
             <a:off x="914400" y="2133600"/>
-            <a:ext cx="8691034" cy="3108543"/>
+            <a:ext cx="8691034" cy="3970318"/>
           </a:xfrm>
           <a:prstGeom prst="rect">
             <a:avLst/>
@@ -3273,6 +3274,25 @@
               </a:rPr>
               <a:t>Zero</a:t>
             </a:r>
+          </a:p>
+          <a:p>
+            <a:r>
+              <a:rPr lang="en-US" altLang="zh-CN" sz="2800" dirty="0" smtClean="0">
+                <a:sym typeface="Wingdings" panose="05000000000000000000" pitchFamily="2" charset="2"/>
+              </a:rPr>
+              <a:t>1  One</a:t>
+            </a:r>
+          </a:p>
+          <a:p>
+            <a:r>
+              <a:rPr lang="en-US" altLang="zh-CN" sz="2800" dirty="0" smtClean="0">
+                <a:sym typeface="Wingdings" panose="05000000000000000000" pitchFamily="2" charset="2"/>
+              </a:rPr>
+              <a:t>2 Two</a:t>
+            </a:r>
+            <a:endParaRPr lang="en-US" altLang="zh-CN" sz="2800" dirty="0" smtClean="0">
+              <a:sym typeface="Wingdings" panose="05000000000000000000" pitchFamily="2" charset="2"/>
+            </a:endParaRPr>
           </a:p>
           <a:p>
             <a:r>
@@ -3654,6 +3674,222 @@
     <p:extLst>
       <p:ext uri="{BB962C8B-B14F-4D97-AF65-F5344CB8AC3E}">
         <p14:creationId xmlns:p14="http://schemas.microsoft.com/office/powerpoint/2010/main" val="1560659315"/>
+      </p:ext>
+    </p:extLst>
+  </p:cSld>
+  <p:clrMapOvr>
+    <a:masterClrMapping/>
+  </p:clrMapOvr>
+</p:sld>
+</file>
+
+<file path=ppt/slides/slide5.xml><?xml version="1.0" encoding="utf-8"?>
+<p:sld xmlns:a="http://schemas.openxmlformats.org/drawingml/2006/main" xmlns:r="http://schemas.openxmlformats.org/officeDocument/2006/relationships" xmlns:p="http://schemas.openxmlformats.org/presentationml/2006/main">
+  <p:cSld>
+    <p:spTree>
+      <p:nvGrpSpPr>
+        <p:cNvPr id="1" name=""/>
+        <p:cNvGrpSpPr/>
+        <p:nvPr/>
+      </p:nvGrpSpPr>
+      <p:grpSpPr>
+        <a:xfrm>
+          <a:off x="0" y="0"/>
+          <a:ext cx="0" cy="0"/>
+          <a:chOff x="0" y="0"/>
+          <a:chExt cx="0" cy="0"/>
+        </a:xfrm>
+      </p:grpSpPr>
+      <p:sp>
+        <p:nvSpPr>
+          <p:cNvPr id="2" name="Title 1"/>
+          <p:cNvSpPr>
+            <a:spLocks noGrp="1"/>
+          </p:cNvSpPr>
+          <p:nvPr>
+            <p:ph type="title"/>
+          </p:nvPr>
+        </p:nvSpPr>
+        <p:spPr/>
+        <p:txBody>
+          <a:bodyPr/>
+          <a:lstStyle/>
+          <a:p>
+            <a:r>
+              <a:rPr lang="en-US" dirty="0" smtClean="0"/>
+              <a:t>Homework</a:t>
+            </a:r>
+            <a:endParaRPr lang="en-US" dirty="0"/>
+          </a:p>
+        </p:txBody>
+      </p:sp>
+      <p:sp>
+        <p:nvSpPr>
+          <p:cNvPr id="4" name="Rectangle 3"/>
+          <p:cNvSpPr/>
+          <p:nvPr/>
+        </p:nvSpPr>
+        <p:spPr>
+          <a:xfrm>
+            <a:off x="609600" y="1524000"/>
+            <a:ext cx="8001000" cy="4801314"/>
+          </a:xfrm>
+          <a:prstGeom prst="rect">
+            <a:avLst/>
+          </a:prstGeom>
+        </p:spPr>
+        <p:txBody>
+          <a:bodyPr wrap="square">
+            <a:spAutoFit/>
+          </a:bodyPr>
+          <a:lstStyle/>
+          <a:p>
+            <a:r>
+              <a:rPr lang="en-US" dirty="0"/>
+              <a:t>The Romans wrote numbers using letters - I, V, X, L, C, D, </a:t>
+            </a:r>
+            <a:r>
+              <a:rPr lang="en-US" dirty="0" smtClean="0"/>
+              <a:t>M. </a:t>
+            </a:r>
+            <a:r>
+              <a:rPr lang="en-US" dirty="0"/>
+              <a:t>you should write a function to convert from normal </a:t>
+            </a:r>
+            <a:r>
+              <a:rPr lang="en-US" dirty="0" smtClean="0"/>
+              <a:t>numbers (0-1000) </a:t>
+            </a:r>
+            <a:r>
+              <a:rPr lang="en-US" dirty="0"/>
+              <a:t>to Roman </a:t>
+            </a:r>
+            <a:r>
+              <a:rPr lang="en-US" dirty="0" smtClean="0"/>
+              <a:t>Numerals.</a:t>
+            </a:r>
+          </a:p>
+          <a:p>
+            <a:endParaRPr lang="en-US" dirty="0"/>
+          </a:p>
+          <a:p>
+            <a:r>
+              <a:rPr lang="en-US" dirty="0" smtClean="0"/>
+              <a:t>I </a:t>
+            </a:r>
+            <a:r>
+              <a:rPr lang="en-US" dirty="0" smtClean="0">
+                <a:sym typeface="Wingdings" panose="05000000000000000000" pitchFamily="2" charset="2"/>
+              </a:rPr>
+              <a:t> 1</a:t>
+            </a:r>
+          </a:p>
+          <a:p>
+            <a:r>
+              <a:rPr lang="en-US" dirty="0" smtClean="0">
+                <a:sym typeface="Wingdings" panose="05000000000000000000" pitchFamily="2" charset="2"/>
+              </a:rPr>
+              <a:t>V  5</a:t>
+            </a:r>
+          </a:p>
+          <a:p>
+            <a:r>
+              <a:rPr lang="en-US" dirty="0" smtClean="0">
+                <a:sym typeface="Wingdings" panose="05000000000000000000" pitchFamily="2" charset="2"/>
+              </a:rPr>
+              <a:t>X  10</a:t>
+            </a:r>
+          </a:p>
+          <a:p>
+            <a:r>
+              <a:rPr lang="en-US" dirty="0" smtClean="0">
+                <a:sym typeface="Wingdings" panose="05000000000000000000" pitchFamily="2" charset="2"/>
+              </a:rPr>
+              <a:t>L  50</a:t>
+            </a:r>
+          </a:p>
+          <a:p>
+            <a:r>
+              <a:rPr lang="en-US" dirty="0" smtClean="0">
+                <a:sym typeface="Wingdings" panose="05000000000000000000" pitchFamily="2" charset="2"/>
+              </a:rPr>
+              <a:t>C  100</a:t>
+            </a:r>
+          </a:p>
+          <a:p>
+            <a:r>
+              <a:rPr lang="en-US" dirty="0" smtClean="0">
+                <a:sym typeface="Wingdings" panose="05000000000000000000" pitchFamily="2" charset="2"/>
+              </a:rPr>
+              <a:t>D  500</a:t>
+            </a:r>
+          </a:p>
+          <a:p>
+            <a:r>
+              <a:rPr lang="en-US" dirty="0" smtClean="0">
+                <a:sym typeface="Wingdings" panose="05000000000000000000" pitchFamily="2" charset="2"/>
+              </a:rPr>
+              <a:t>M  1000</a:t>
+            </a:r>
+          </a:p>
+          <a:p>
+            <a:endParaRPr lang="en-US" dirty="0">
+              <a:sym typeface="Wingdings" panose="05000000000000000000" pitchFamily="2" charset="2"/>
+            </a:endParaRPr>
+          </a:p>
+          <a:p>
+            <a:r>
+              <a:rPr lang="en-US" dirty="0" smtClean="0">
+                <a:sym typeface="Wingdings" panose="05000000000000000000" pitchFamily="2" charset="2"/>
+              </a:rPr>
+              <a:t>4  IV</a:t>
+            </a:r>
+          </a:p>
+          <a:p>
+            <a:r>
+              <a:rPr lang="en-US" dirty="0" smtClean="0">
+                <a:sym typeface="Wingdings" panose="05000000000000000000" pitchFamily="2" charset="2"/>
+              </a:rPr>
+              <a:t>7  VII</a:t>
+            </a:r>
+          </a:p>
+          <a:p>
+            <a:r>
+              <a:rPr lang="en-US" dirty="0" smtClean="0">
+                <a:sym typeface="Wingdings" panose="05000000000000000000" pitchFamily="2" charset="2"/>
+              </a:rPr>
+              <a:t>9  IX</a:t>
+            </a:r>
+          </a:p>
+          <a:p>
+            <a:endParaRPr lang="en-US" dirty="0">
+              <a:sym typeface="Wingdings" panose="05000000000000000000" pitchFamily="2" charset="2"/>
+            </a:endParaRPr>
+          </a:p>
+          <a:p>
+            <a:r>
+              <a:rPr lang="en-US" dirty="0">
+                <a:hlinkClick r:id="rId2"/>
+              </a:rPr>
+              <a:t>http://</a:t>
+            </a:r>
+            <a:r>
+              <a:rPr lang="en-US" dirty="0" smtClean="0">
+                <a:hlinkClick r:id="rId2"/>
+              </a:rPr>
+              <a:t>www.novaroma.org/via_romana/numbers.html</a:t>
+            </a:r>
+            <a:endParaRPr lang="en-US" dirty="0" smtClean="0"/>
+          </a:p>
+          <a:p>
+            <a:endParaRPr lang="en-US" dirty="0"/>
+          </a:p>
+        </p:txBody>
+      </p:sp>
+    </p:spTree>
+    <p:extLst>
+      <p:ext uri="{BB962C8B-B14F-4D97-AF65-F5344CB8AC3E}">
+        <p14:creationId xmlns:p14="http://schemas.microsoft.com/office/powerpoint/2010/main" val="3887268560"/>
       </p:ext>
     </p:extLst>
   </p:cSld>

</xml_diff>

<commit_message>
update TDD hands on docs
</commit_message>
<xml_diff>
--- a/Documents/TDD Hands On 2.pptx
+++ b/Documents/TDD Hands On 2.pptx
@@ -3161,6 +3161,13 @@
   <p:clrMapOvr>
     <a:masterClrMapping/>
   </p:clrMapOvr>
+  <p:timing>
+    <p:tnLst>
+      <p:par>
+        <p:cTn id="1" dur="indefinite" restart="never" nodeType="tmRoot"/>
+      </p:par>
+    </p:tnLst>
+  </p:timing>
 </p:sld>
 </file>
 
@@ -3212,8 +3219,8 @@
         </p:nvSpPr>
         <p:spPr>
           <a:xfrm>
-            <a:off x="914400" y="2133600"/>
-            <a:ext cx="8691034" cy="3970318"/>
+            <a:off x="914400" y="1524000"/>
+            <a:ext cx="7391400" cy="4832092"/>
           </a:xfrm>
           <a:prstGeom prst="rect">
             <a:avLst/>
@@ -3221,7 +3228,7 @@
           <a:noFill/>
         </p:spPr>
         <p:txBody>
-          <a:bodyPr wrap="none" rtlCol="0">
+          <a:bodyPr wrap="square" rtlCol="0">
             <a:spAutoFit/>
           </a:bodyPr>
           <a:lstStyle/>
@@ -3290,9 +3297,6 @@
               </a:rPr>
               <a:t>2 Two</a:t>
             </a:r>
-            <a:endParaRPr lang="en-US" altLang="zh-CN" sz="2800" dirty="0" smtClean="0">
-              <a:sym typeface="Wingdings" panose="05000000000000000000" pitchFamily="2" charset="2"/>
-            </a:endParaRPr>
           </a:p>
           <a:p>
             <a:r>
@@ -3349,6 +3353,13 @@
   <p:clrMapOvr>
     <a:masterClrMapping/>
   </p:clrMapOvr>
+  <p:timing>
+    <p:tnLst>
+      <p:par>
+        <p:cTn id="1" dur="indefinite" restart="never" nodeType="tmRoot"/>
+      </p:par>
+    </p:tnLst>
+  </p:timing>
 </p:sld>
 </file>
 
@@ -3581,6 +3592,13 @@
   <p:clrMapOvr>
     <a:masterClrMapping/>
   </p:clrMapOvr>
+  <p:timing>
+    <p:tnLst>
+      <p:par>
+        <p:cTn id="1" dur="indefinite" restart="never" nodeType="tmRoot"/>
+      </p:par>
+    </p:tnLst>
+  </p:timing>
 </p:sld>
 </file>
 
@@ -3680,6 +3698,13 @@
   <p:clrMapOvr>
     <a:masterClrMapping/>
   </p:clrMapOvr>
+  <p:timing>
+    <p:tnLst>
+      <p:par>
+        <p:cTn id="1" dur="indefinite" restart="never" nodeType="tmRoot"/>
+      </p:par>
+    </p:tnLst>
+  </p:timing>
 </p:sld>
 </file>
 
@@ -3896,6 +3921,13 @@
   <p:clrMapOvr>
     <a:masterClrMapping/>
   </p:clrMapOvr>
+  <p:timing>
+    <p:tnLst>
+      <p:par>
+        <p:cTn id="1" dur="indefinite" restart="never" nodeType="tmRoot"/>
+      </p:par>
+    </p:tnLst>
+  </p:timing>
 </p:sld>
 </file>
 

</xml_diff>